<commit_message>
Autopsy links from class.
</commit_message>
<xml_diff>
--- a/slides/classfourteen/slides.pptx
+++ b/slides/classfourteen/slides.pptx
@@ -209,7 +209,7 @@
           <a:p>
             <a:fld id="{9B5D41C8-0A92-DD47-AB00-F0EFFD66679B}" type="datetimeFigureOut">
               <a:rPr lang="en-US" smtClean="0"/>
-              <a:t>12/7/11</a:t>
+              <a:t>12/13/11</a:t>
             </a:fld>
             <a:endParaRPr lang="en-US"/>
           </a:p>
@@ -2525,7 +2525,7 @@
             <a:fld id="{B7C3F878-F5E8-489B-AC8A-64F2A7E22C28}" type="datetimeFigureOut">
               <a:rPr lang="en-US" smtClean="0"/>
               <a:pPr/>
-              <a:t>12/7/11</a:t>
+              <a:t>12/13/11</a:t>
             </a:fld>
             <a:endParaRPr lang="en-US"/>
           </a:p>
@@ -2732,7 +2732,7 @@
             <a:fld id="{B7C3F878-F5E8-489B-AC8A-64F2A7E22C28}" type="datetimeFigureOut">
               <a:rPr lang="en-US" smtClean="0"/>
               <a:pPr/>
-              <a:t>12/7/11</a:t>
+              <a:t>12/13/11</a:t>
             </a:fld>
             <a:endParaRPr lang="en-US"/>
           </a:p>
@@ -2939,7 +2939,7 @@
             <a:fld id="{B7C3F878-F5E8-489B-AC8A-64F2A7E22C28}" type="datetimeFigureOut">
               <a:rPr lang="en-US" smtClean="0"/>
               <a:pPr/>
-              <a:t>12/7/11</a:t>
+              <a:t>12/13/11</a:t>
             </a:fld>
             <a:endParaRPr lang="en-US"/>
           </a:p>
@@ -3132,7 +3132,7 @@
             <a:fld id="{B7C3F878-F5E8-489B-AC8A-64F2A7E22C28}" type="datetimeFigureOut">
               <a:rPr lang="en-US" smtClean="0"/>
               <a:pPr/>
-              <a:t>12/7/11</a:t>
+              <a:t>12/13/11</a:t>
             </a:fld>
             <a:endParaRPr lang="en-US"/>
           </a:p>
@@ -3373,7 +3373,7 @@
             <a:fld id="{B7C3F878-F5E8-489B-AC8A-64F2A7E22C28}" type="datetimeFigureOut">
               <a:rPr lang="en-US" smtClean="0"/>
               <a:pPr/>
-              <a:t>12/7/11</a:t>
+              <a:t>12/13/11</a:t>
             </a:fld>
             <a:endParaRPr lang="en-US"/>
           </a:p>
@@ -3488,7 +3488,7 @@
             <a:fld id="{B7C3F878-F5E8-489B-AC8A-64F2A7E22C28}" type="datetimeFigureOut">
               <a:rPr lang="en-US" smtClean="0"/>
               <a:pPr/>
-              <a:t>12/7/11</a:t>
+              <a:t>12/13/11</a:t>
             </a:fld>
             <a:endParaRPr lang="en-US"/>
           </a:p>
@@ -3920,7 +3920,7 @@
             <a:fld id="{B7C3F878-F5E8-489B-AC8A-64F2A7E22C28}" type="datetimeFigureOut">
               <a:rPr lang="en-US" smtClean="0"/>
               <a:pPr/>
-              <a:t>12/7/11</a:t>
+              <a:t>12/13/11</a:t>
             </a:fld>
             <a:endParaRPr lang="en-US"/>
           </a:p>
@@ -4201,7 +4201,7 @@
             <a:fld id="{B7C3F878-F5E8-489B-AC8A-64F2A7E22C28}" type="datetimeFigureOut">
               <a:rPr lang="en-US" smtClean="0"/>
               <a:pPr/>
-              <a:t>12/7/11</a:t>
+              <a:t>12/13/11</a:t>
             </a:fld>
             <a:endParaRPr lang="en-US"/>
           </a:p>
@@ -4293,7 +4293,7 @@
             <a:fld id="{B7C3F878-F5E8-489B-AC8A-64F2A7E22C28}" type="datetimeFigureOut">
               <a:rPr lang="en-US" smtClean="0"/>
               <a:pPr/>
-              <a:t>12/7/11</a:t>
+              <a:t>12/13/11</a:t>
             </a:fld>
             <a:endParaRPr lang="en-US"/>
           </a:p>
@@ -5132,7 +5132,7 @@
             <a:fld id="{B7C3F878-F5E8-489B-AC8A-64F2A7E22C28}" type="datetimeFigureOut">
               <a:rPr lang="en-US" smtClean="0"/>
               <a:pPr/>
-              <a:t>12/7/11</a:t>
+              <a:t>12/13/11</a:t>
             </a:fld>
             <a:endParaRPr lang="en-US"/>
           </a:p>
@@ -5965,7 +5965,7 @@
             <a:fld id="{B7C3F878-F5E8-489B-AC8A-64F2A7E22C28}" type="datetimeFigureOut">
               <a:rPr lang="en-US" smtClean="0"/>
               <a:pPr/>
-              <a:t>12/7/11</a:t>
+              <a:t>12/13/11</a:t>
             </a:fld>
             <a:endParaRPr lang="en-US"/>
           </a:p>
@@ -6621,7 +6621,7 @@
             <a:fld id="{B7C3F878-F5E8-489B-AC8A-64F2A7E22C28}" type="datetimeFigureOut">
               <a:rPr lang="en-US" smtClean="0"/>
               <a:pPr/>
-              <a:t>12/7/11</a:t>
+              <a:t>12/13/11</a:t>
             </a:fld>
             <a:endParaRPr lang="en-US" dirty="0"/>
           </a:p>
@@ -8347,7 +8347,49 @@
           </a:bodyPr>
           <a:lstStyle/>
           <a:p>
-            <a:endParaRPr lang="en-US" dirty="0"/>
+            <a:r>
+              <a:rPr lang="en-US" dirty="0">
+                <a:hlinkClick r:id="rId3"/>
+              </a:rPr>
+              <a:t>http://www.middlebury.edu/#</a:t>
+            </a:r>
+            <a:r>
+              <a:rPr lang="en-US" dirty="0" smtClean="0">
+                <a:hlinkClick r:id="rId3"/>
+              </a:rPr>
+              <a:t>story276576</a:t>
+            </a:r>
+            <a:endParaRPr lang="en-US" dirty="0" smtClean="0"/>
+          </a:p>
+          <a:p>
+            <a:r>
+              <a:rPr lang="en-US" dirty="0">
+                <a:hlinkClick r:id="rId4"/>
+              </a:rPr>
+              <a:t>http://soulwire.co.uk/</a:t>
+            </a:r>
+            <a:r>
+              <a:rPr lang="en-US" dirty="0" smtClean="0">
+                <a:hlinkClick r:id="rId4"/>
+              </a:rPr>
+              <a:t>hello</a:t>
+            </a:r>
+            <a:endParaRPr lang="en-US" dirty="0" smtClean="0"/>
+          </a:p>
+          <a:p>
+            <a:r>
+              <a:rPr lang="en-US" dirty="0">
+                <a:hlinkClick r:id="rId5"/>
+              </a:rPr>
+              <a:t>http://abc.go.com</a:t>
+            </a:r>
+            <a:r>
+              <a:rPr lang="en-US" smtClean="0">
+                <a:hlinkClick r:id="rId5"/>
+              </a:rPr>
+              <a:t>/</a:t>
+            </a:r>
+            <a:endParaRPr lang="en-US" dirty="0" smtClean="0"/>
           </a:p>
         </p:txBody>
       </p:sp>

</xml_diff>